<commit_message>
331 : Lab05 세팅
</commit_message>
<xml_diff>
--- a/Game 330 Unity/Unity Tutorial/Scriptable Object Tutorial.pptx
+++ b/Game 330 Unity/Unity Tutorial/Scriptable Object Tutorial.pptx
@@ -5,10 +5,10 @@
     <p:sldMasterId id="2147483648" r:id="rId4"/>
   </p:sldMasterIdLst>
   <p:notesMasterIdLst>
-    <p:notesMasterId r:id="rId15"/>
+    <p:notesMasterId r:id="rId14"/>
   </p:notesMasterIdLst>
   <p:handoutMasterIdLst>
-    <p:handoutMasterId r:id="rId16"/>
+    <p:handoutMasterId r:id="rId15"/>
   </p:handoutMasterIdLst>
   <p:sldIdLst>
     <p:sldId id="323" r:id="rId5"/>
@@ -16,16 +16,15 @@
     <p:sldId id="326" r:id="rId7"/>
     <p:sldId id="327" r:id="rId8"/>
     <p:sldId id="328" r:id="rId9"/>
-    <p:sldId id="329" r:id="rId10"/>
+    <p:sldId id="331" r:id="rId10"/>
     <p:sldId id="332" r:id="rId11"/>
-    <p:sldId id="331" r:id="rId12"/>
-    <p:sldId id="330" r:id="rId13"/>
-    <p:sldId id="333" r:id="rId14"/>
+    <p:sldId id="330" r:id="rId12"/>
+    <p:sldId id="333" r:id="rId13"/>
   </p:sldIdLst>
   <p:sldSz cx="12188825" cy="6858000"/>
   <p:notesSz cx="6858000" cy="9144000"/>
   <p:custDataLst>
-    <p:tags r:id="rId17"/>
+    <p:tags r:id="rId16"/>
   </p:custDataLst>
   <p:defaultTextStyle>
     <a:defPPr>
@@ -226,7 +225,7 @@
           <a:p>
             <a:fld id="{59088EAF-6ECA-4616-85EF-35AA19C641F3}" type="datetimeFigureOut">
               <a:rPr lang="en-US"/>
-              <a:t>9/24/2023</a:t>
+              <a:t>9/25/2023</a:t>
             </a:fld>
             <a:endParaRPr/>
           </a:p>
@@ -391,7 +390,7 @@
           <a:p>
             <a:fld id="{3ABD2D7A-D230-4F91-BD59-0A39C2703BA8}" type="datetimeFigureOut">
               <a:rPr lang="en-US"/>
-              <a:t>9/24/2023</a:t>
+              <a:t>9/25/2023</a:t>
             </a:fld>
             <a:endParaRPr/>
           </a:p>
@@ -1071,22 +1070,6 @@
           <a:bodyPr/>
           <a:lstStyle/>
           <a:p>
-            <a:r>
-              <a:rPr lang="ko-KR" altLang="en-US" dirty="0"/>
-              <a:t>그 외에도 </a:t>
-            </a:r>
-            <a:r>
-              <a:rPr lang="en-US" altLang="ko-KR" dirty="0"/>
-              <a:t>Array, Enum </a:t>
-            </a:r>
-            <a:r>
-              <a:rPr lang="ko-KR" altLang="en-US" dirty="0"/>
-              <a:t>등등 무궁무진함</a:t>
-            </a:r>
-            <a:r>
-              <a:rPr lang="en-US" altLang="ko-KR" dirty="0"/>
-              <a:t>.</a:t>
-            </a:r>
             <a:endParaRPr lang="ko-KR" altLang="en-US" dirty="0"/>
           </a:p>
         </p:txBody>
@@ -1108,7 +1091,7 @@
           <a:p>
             <a:fld id="{F93199CD-3E1B-4AE6-990F-76F925F5EA9F}" type="slidenum">
               <a:rPr lang="en-US" altLang="ko-KR" smtClean="0"/>
-              <a:t>7</a:t>
+              <a:t>4</a:t>
             </a:fld>
             <a:endParaRPr lang="en-US" altLang="ko-KR"/>
           </a:p>
@@ -1117,7 +1100,7 @@
     </p:spTree>
     <p:extLst>
       <p:ext uri="{BB962C8B-B14F-4D97-AF65-F5344CB8AC3E}">
-        <p14:creationId xmlns:p14="http://schemas.microsoft.com/office/powerpoint/2010/main" val="2539074973"/>
+        <p14:creationId xmlns:p14="http://schemas.microsoft.com/office/powerpoint/2010/main" val="2865447543"/>
       </p:ext>
     </p:extLst>
   </p:cSld>
@@ -1171,505 +1154,22 @@
           <a:bodyPr/>
           <a:lstStyle/>
           <a:p>
-            <a:pPr algn="l">
-              <a:buFont typeface="Arial" panose="020B0604020202020204" pitchFamily="34" charset="0"/>
-              <a:buChar char="•"/>
-            </a:pPr>
-            <a:r>
-              <a:rPr lang="ko-KR" altLang="en-US" b="0" i="0" dirty="0">
-                <a:solidFill>
-                  <a:srgbClr val="374151"/>
-                </a:solidFill>
-                <a:effectLst/>
-                <a:latin typeface="Söhne"/>
-              </a:rPr>
-              <a:t>메모리 효율성</a:t>
-            </a:r>
-            <a:r>
-              <a:rPr lang="en-US" altLang="ko-KR" b="0" i="0" dirty="0">
-                <a:solidFill>
-                  <a:srgbClr val="374151"/>
-                </a:solidFill>
-                <a:effectLst/>
-                <a:latin typeface="Söhne"/>
-              </a:rPr>
-              <a:t>: Scene</a:t>
-            </a:r>
-            <a:r>
-              <a:rPr lang="ko-KR" altLang="en-US" b="0" i="0" dirty="0">
-                <a:solidFill>
-                  <a:srgbClr val="374151"/>
-                </a:solidFill>
-                <a:effectLst/>
-                <a:latin typeface="Söhne"/>
-              </a:rPr>
-              <a:t>이 변경되어도 데이터가 유지되므로</a:t>
-            </a:r>
-            <a:r>
-              <a:rPr lang="en-US" altLang="ko-KR" b="0" i="0" dirty="0">
-                <a:solidFill>
-                  <a:srgbClr val="374151"/>
-                </a:solidFill>
-                <a:effectLst/>
-                <a:latin typeface="Söhne"/>
-              </a:rPr>
-              <a:t>, </a:t>
-            </a:r>
-            <a:r>
-              <a:rPr lang="ko-KR" altLang="en-US" b="0" i="0" dirty="0">
-                <a:solidFill>
-                  <a:srgbClr val="374151"/>
-                </a:solidFill>
-                <a:effectLst/>
-                <a:latin typeface="Söhne"/>
-              </a:rPr>
-              <a:t>메모리 사용이 효율적입니다</a:t>
-            </a:r>
-            <a:r>
-              <a:rPr lang="en-US" altLang="ko-KR" b="0" i="0" dirty="0">
-                <a:solidFill>
-                  <a:srgbClr val="374151"/>
-                </a:solidFill>
-                <a:effectLst/>
-                <a:latin typeface="Söhne"/>
-              </a:rPr>
+            <a:r>
+              <a:rPr lang="ko-KR" altLang="en-US" dirty="0"/>
+              <a:t>그 외에도 </a:t>
+            </a:r>
+            <a:r>
+              <a:rPr lang="en-US" altLang="ko-KR" dirty="0"/>
+              <a:t>Array, Enum </a:t>
+            </a:r>
+            <a:r>
+              <a:rPr lang="ko-KR" altLang="en-US" dirty="0"/>
+              <a:t>등등 무궁무진함</a:t>
+            </a:r>
+            <a:r>
+              <a:rPr lang="en-US" altLang="ko-KR" dirty="0"/>
               <a:t>.</a:t>
             </a:r>
-          </a:p>
-          <a:p>
-            <a:pPr algn="l">
-              <a:buFont typeface="Arial" panose="020B0604020202020204" pitchFamily="34" charset="0"/>
-              <a:buChar char="•"/>
-            </a:pPr>
-            <a:r>
-              <a:rPr lang="ko-KR" altLang="en-US" b="0" i="0" dirty="0">
-                <a:solidFill>
-                  <a:srgbClr val="374151"/>
-                </a:solidFill>
-                <a:effectLst/>
-                <a:latin typeface="Söhne"/>
-              </a:rPr>
-              <a:t>재사용성</a:t>
-            </a:r>
-            <a:r>
-              <a:rPr lang="en-US" altLang="ko-KR" b="0" i="0" dirty="0">
-                <a:solidFill>
-                  <a:srgbClr val="374151"/>
-                </a:solidFill>
-                <a:effectLst/>
-                <a:latin typeface="Söhne"/>
-              </a:rPr>
-              <a:t>: </a:t>
-            </a:r>
-            <a:r>
-              <a:rPr lang="ko-KR" altLang="en-US" b="0" i="0" dirty="0">
-                <a:solidFill>
-                  <a:srgbClr val="374151"/>
-                </a:solidFill>
-                <a:effectLst/>
-                <a:latin typeface="Söhne"/>
-              </a:rPr>
-              <a:t>동일한 데이터를 여러 게임 오브젝트에서 재사용할 수 있습니다</a:t>
-            </a:r>
-            <a:r>
-              <a:rPr lang="en-US" altLang="ko-KR" b="0" i="0" dirty="0">
-                <a:solidFill>
-                  <a:srgbClr val="374151"/>
-                </a:solidFill>
-                <a:effectLst/>
-                <a:latin typeface="Söhne"/>
-              </a:rPr>
-              <a:t>.</a:t>
-            </a:r>
-          </a:p>
-          <a:p>
-            <a:pPr algn="l">
-              <a:buFont typeface="Arial" panose="020B0604020202020204" pitchFamily="34" charset="0"/>
-              <a:buChar char="•"/>
-            </a:pPr>
-            <a:r>
-              <a:rPr lang="ko-KR" altLang="en-US" b="0" i="0" dirty="0">
-                <a:solidFill>
-                  <a:srgbClr val="374151"/>
-                </a:solidFill>
-                <a:effectLst/>
-                <a:latin typeface="Söhne"/>
-              </a:rPr>
-              <a:t>확장성</a:t>
-            </a:r>
-            <a:r>
-              <a:rPr lang="en-US" altLang="ko-KR" b="0" i="0" dirty="0">
-                <a:solidFill>
-                  <a:srgbClr val="374151"/>
-                </a:solidFill>
-                <a:effectLst/>
-                <a:latin typeface="Söhne"/>
-              </a:rPr>
-              <a:t>: </a:t>
-            </a:r>
-            <a:r>
-              <a:rPr lang="ko-KR" altLang="en-US" b="0" i="0" dirty="0">
-                <a:solidFill>
-                  <a:srgbClr val="374151"/>
-                </a:solidFill>
-                <a:effectLst/>
-                <a:latin typeface="Söhne"/>
-              </a:rPr>
-              <a:t>데이터 구조를 쉽게 확장하고 수정할 수 있습니다</a:t>
-            </a:r>
-            <a:r>
-              <a:rPr lang="en-US" altLang="ko-KR" b="0" i="0" dirty="0">
-                <a:solidFill>
-                  <a:srgbClr val="374151"/>
-                </a:solidFill>
-                <a:effectLst/>
-                <a:latin typeface="Söhne"/>
-              </a:rPr>
-              <a:t>.</a:t>
-            </a:r>
-          </a:p>
-          <a:p>
-            <a:endParaRPr lang="en-US" altLang="ko-KR" dirty="0"/>
-          </a:p>
-          <a:p>
-            <a:pPr algn="l">
-              <a:buFont typeface="+mj-lt"/>
-              <a:buAutoNum type="arabicPeriod"/>
-            </a:pPr>
-            <a:r>
-              <a:rPr lang="ko-KR" altLang="en-US" b="1" i="0" dirty="0" err="1">
-                <a:solidFill>
-                  <a:srgbClr val="374151"/>
-                </a:solidFill>
-                <a:effectLst/>
-                <a:latin typeface="Söhne"/>
-              </a:rPr>
-              <a:t>디커플링</a:t>
-            </a:r>
-            <a:r>
-              <a:rPr lang="en-US" altLang="ko-KR" b="1" i="0" dirty="0">
-                <a:solidFill>
-                  <a:srgbClr val="374151"/>
-                </a:solidFill>
-                <a:effectLst/>
-                <a:latin typeface="Söhne"/>
-              </a:rPr>
-              <a:t>(Decoupling)</a:t>
-            </a:r>
-            <a:r>
-              <a:rPr lang="en-US" altLang="ko-KR" b="0" i="0" dirty="0">
-                <a:solidFill>
-                  <a:srgbClr val="374151"/>
-                </a:solidFill>
-                <a:effectLst/>
-                <a:latin typeface="Söhne"/>
-              </a:rPr>
-              <a:t>:</a:t>
-            </a:r>
-          </a:p>
-          <a:p>
-            <a:pPr marL="742950" lvl="1" indent="-285750" algn="l">
-              <a:buFont typeface="+mj-lt"/>
-              <a:buAutoNum type="arabicPeriod"/>
-            </a:pPr>
-            <a:r>
-              <a:rPr lang="ko-KR" altLang="en-US" b="0" i="0" dirty="0">
-                <a:solidFill>
-                  <a:srgbClr val="374151"/>
-                </a:solidFill>
-                <a:effectLst/>
-                <a:latin typeface="Söhne"/>
-              </a:rPr>
-              <a:t>이벤트 발생 소스와 이벤트를 처리하는 </a:t>
-            </a:r>
-            <a:r>
-              <a:rPr lang="ko-KR" altLang="en-US" b="0" i="0" dirty="0" err="1">
-                <a:solidFill>
-                  <a:srgbClr val="374151"/>
-                </a:solidFill>
-                <a:effectLst/>
-                <a:latin typeface="Söhne"/>
-              </a:rPr>
-              <a:t>리스너</a:t>
-            </a:r>
-            <a:r>
-              <a:rPr lang="ko-KR" altLang="en-US" b="0" i="0" dirty="0">
-                <a:solidFill>
-                  <a:srgbClr val="374151"/>
-                </a:solidFill>
-                <a:effectLst/>
-                <a:latin typeface="Söhne"/>
-              </a:rPr>
-              <a:t> 사이의 종속성을 줄일 수 있습니다</a:t>
-            </a:r>
-            <a:r>
-              <a:rPr lang="en-US" altLang="ko-KR" b="0" i="0" dirty="0">
-                <a:solidFill>
-                  <a:srgbClr val="374151"/>
-                </a:solidFill>
-                <a:effectLst/>
-                <a:latin typeface="Söhne"/>
-              </a:rPr>
-              <a:t>.</a:t>
-            </a:r>
-          </a:p>
-          <a:p>
-            <a:pPr marL="742950" lvl="1" indent="-285750" algn="l">
-              <a:buFont typeface="+mj-lt"/>
-              <a:buAutoNum type="arabicPeriod"/>
-            </a:pPr>
-            <a:r>
-              <a:rPr lang="ko-KR" altLang="en-US" b="0" i="0" dirty="0">
-                <a:solidFill>
-                  <a:srgbClr val="374151"/>
-                </a:solidFill>
-                <a:effectLst/>
-                <a:latin typeface="Söhne"/>
-              </a:rPr>
-              <a:t>이로 인해 코드의 모듈성과 재사용성이 향상됩니다</a:t>
-            </a:r>
-            <a:r>
-              <a:rPr lang="en-US" altLang="ko-KR" b="0" i="0" dirty="0">
-                <a:solidFill>
-                  <a:srgbClr val="374151"/>
-                </a:solidFill>
-                <a:effectLst/>
-                <a:latin typeface="Söhne"/>
-              </a:rPr>
-              <a:t>.</a:t>
-            </a:r>
-          </a:p>
-          <a:p>
-            <a:pPr algn="l">
-              <a:buFont typeface="+mj-lt"/>
-              <a:buAutoNum type="arabicPeriod"/>
-            </a:pPr>
-            <a:r>
-              <a:rPr lang="ko-KR" altLang="en-US" b="1" i="0" dirty="0">
-                <a:solidFill>
-                  <a:srgbClr val="374151"/>
-                </a:solidFill>
-                <a:effectLst/>
-                <a:latin typeface="Söhne"/>
-              </a:rPr>
-              <a:t>유연성</a:t>
-            </a:r>
-            <a:r>
-              <a:rPr lang="en-US" altLang="ko-KR" b="0" i="0" dirty="0">
-                <a:solidFill>
-                  <a:srgbClr val="374151"/>
-                </a:solidFill>
-                <a:effectLst/>
-                <a:latin typeface="Söhne"/>
-              </a:rPr>
-              <a:t>:</a:t>
-            </a:r>
-          </a:p>
-          <a:p>
-            <a:pPr marL="742950" lvl="1" indent="-285750" algn="l">
-              <a:buFont typeface="+mj-lt"/>
-              <a:buAutoNum type="arabicPeriod"/>
-            </a:pPr>
-            <a:r>
-              <a:rPr lang="ko-KR" altLang="en-US" b="0" i="0" dirty="0" err="1">
-                <a:solidFill>
-                  <a:srgbClr val="374151"/>
-                </a:solidFill>
-                <a:effectLst/>
-                <a:latin typeface="Söhne"/>
-              </a:rPr>
-              <a:t>스크립터블</a:t>
-            </a:r>
-            <a:r>
-              <a:rPr lang="ko-KR" altLang="en-US" b="0" i="0" dirty="0">
-                <a:solidFill>
-                  <a:srgbClr val="374151"/>
-                </a:solidFill>
-                <a:effectLst/>
-                <a:latin typeface="Söhne"/>
-              </a:rPr>
-              <a:t> 오브젝트를 이용한 이벤트 시스템은 유연하게 확장 및 수정이 가능합니다</a:t>
-            </a:r>
-            <a:r>
-              <a:rPr lang="en-US" altLang="ko-KR" b="0" i="0" dirty="0">
-                <a:solidFill>
-                  <a:srgbClr val="374151"/>
-                </a:solidFill>
-                <a:effectLst/>
-                <a:latin typeface="Söhne"/>
-              </a:rPr>
-              <a:t>.</a:t>
-            </a:r>
-          </a:p>
-          <a:p>
-            <a:pPr marL="742950" lvl="1" indent="-285750" algn="l">
-              <a:buFont typeface="+mj-lt"/>
-              <a:buAutoNum type="arabicPeriod"/>
-            </a:pPr>
-            <a:r>
-              <a:rPr lang="ko-KR" altLang="en-US" b="0" i="0" dirty="0">
-                <a:solidFill>
-                  <a:srgbClr val="374151"/>
-                </a:solidFill>
-                <a:effectLst/>
-                <a:latin typeface="Söhne"/>
-              </a:rPr>
-              <a:t>다양한 이벤트와 </a:t>
-            </a:r>
-            <a:r>
-              <a:rPr lang="ko-KR" altLang="en-US" b="0" i="0" dirty="0" err="1">
-                <a:solidFill>
-                  <a:srgbClr val="374151"/>
-                </a:solidFill>
-                <a:effectLst/>
-                <a:latin typeface="Söhne"/>
-              </a:rPr>
-              <a:t>리스너를</a:t>
-            </a:r>
-            <a:r>
-              <a:rPr lang="ko-KR" altLang="en-US" b="0" i="0" dirty="0">
-                <a:solidFill>
-                  <a:srgbClr val="374151"/>
-                </a:solidFill>
-                <a:effectLst/>
-                <a:latin typeface="Söhne"/>
-              </a:rPr>
-              <a:t> 쉽게 추가하거나 변경할 수 있습니다</a:t>
-            </a:r>
-            <a:r>
-              <a:rPr lang="en-US" altLang="ko-KR" b="0" i="0" dirty="0">
-                <a:solidFill>
-                  <a:srgbClr val="374151"/>
-                </a:solidFill>
-                <a:effectLst/>
-                <a:latin typeface="Söhne"/>
-              </a:rPr>
-              <a:t>.</a:t>
-            </a:r>
-          </a:p>
-          <a:p>
-            <a:pPr algn="l">
-              <a:buFont typeface="+mj-lt"/>
-              <a:buAutoNum type="arabicPeriod"/>
-            </a:pPr>
-            <a:r>
-              <a:rPr lang="ko-KR" altLang="en-US" b="1" i="0" dirty="0">
-                <a:solidFill>
-                  <a:srgbClr val="374151"/>
-                </a:solidFill>
-                <a:effectLst/>
-                <a:latin typeface="Söhne"/>
-              </a:rPr>
-              <a:t>씬 독립성</a:t>
-            </a:r>
-            <a:r>
-              <a:rPr lang="en-US" altLang="ko-KR" b="0" i="0" dirty="0">
-                <a:solidFill>
-                  <a:srgbClr val="374151"/>
-                </a:solidFill>
-                <a:effectLst/>
-                <a:latin typeface="Söhne"/>
-              </a:rPr>
-              <a:t>:</a:t>
-            </a:r>
-          </a:p>
-          <a:p>
-            <a:pPr marL="742950" lvl="1" indent="-285750" algn="l">
-              <a:buFont typeface="+mj-lt"/>
-              <a:buAutoNum type="arabicPeriod"/>
-            </a:pPr>
-            <a:r>
-              <a:rPr lang="ko-KR" altLang="en-US" b="0" i="0" dirty="0" err="1">
-                <a:solidFill>
-                  <a:srgbClr val="374151"/>
-                </a:solidFill>
-                <a:effectLst/>
-                <a:latin typeface="Söhne"/>
-              </a:rPr>
-              <a:t>스크립터블</a:t>
-            </a:r>
-            <a:r>
-              <a:rPr lang="ko-KR" altLang="en-US" b="0" i="0" dirty="0">
-                <a:solidFill>
-                  <a:srgbClr val="374151"/>
-                </a:solidFill>
-                <a:effectLst/>
-                <a:latin typeface="Söhne"/>
-              </a:rPr>
-              <a:t> 오브젝트는 </a:t>
-            </a:r>
-            <a:r>
-              <a:rPr lang="ko-KR" altLang="en-US" b="0" i="0" dirty="0" err="1">
-                <a:solidFill>
-                  <a:srgbClr val="374151"/>
-                </a:solidFill>
-                <a:effectLst/>
-                <a:latin typeface="Söhne"/>
-              </a:rPr>
-              <a:t>씬에</a:t>
-            </a:r>
-            <a:r>
-              <a:rPr lang="ko-KR" altLang="en-US" b="0" i="0" dirty="0">
-                <a:solidFill>
-                  <a:srgbClr val="374151"/>
-                </a:solidFill>
-                <a:effectLst/>
-                <a:latin typeface="Söhne"/>
-              </a:rPr>
-              <a:t> 종속되지 않으므로</a:t>
-            </a:r>
-            <a:r>
-              <a:rPr lang="en-US" altLang="ko-KR" b="0" i="0" dirty="0">
-                <a:solidFill>
-                  <a:srgbClr val="374151"/>
-                </a:solidFill>
-                <a:effectLst/>
-                <a:latin typeface="Söhne"/>
-              </a:rPr>
-              <a:t>, </a:t>
-            </a:r>
-            <a:r>
-              <a:rPr lang="ko-KR" altLang="en-US" b="0" i="0" dirty="0">
-                <a:solidFill>
-                  <a:srgbClr val="374151"/>
-                </a:solidFill>
-                <a:effectLst/>
-                <a:latin typeface="Söhne"/>
-              </a:rPr>
-              <a:t>여러 </a:t>
-            </a:r>
-            <a:r>
-              <a:rPr lang="ko-KR" altLang="en-US" b="0" i="0" dirty="0" err="1">
-                <a:solidFill>
-                  <a:srgbClr val="374151"/>
-                </a:solidFill>
-                <a:effectLst/>
-                <a:latin typeface="Söhne"/>
-              </a:rPr>
-              <a:t>씬에서</a:t>
-            </a:r>
-            <a:r>
-              <a:rPr lang="ko-KR" altLang="en-US" b="0" i="0" dirty="0">
-                <a:solidFill>
-                  <a:srgbClr val="374151"/>
-                </a:solidFill>
-                <a:effectLst/>
-                <a:latin typeface="Söhne"/>
-              </a:rPr>
-              <a:t> 동일한 이벤트를 공유하고 처리할 수 있습니다</a:t>
-            </a:r>
-            <a:r>
-              <a:rPr lang="en-US" altLang="ko-KR" b="0" i="0" dirty="0">
-                <a:solidFill>
-                  <a:srgbClr val="374151"/>
-                </a:solidFill>
-                <a:effectLst/>
-                <a:latin typeface="Söhne"/>
-              </a:rPr>
-              <a:t>.</a:t>
-            </a:r>
-          </a:p>
-          <a:p>
             <a:endParaRPr lang="ko-KR" altLang="en-US" dirty="0"/>
           </a:p>
         </p:txBody>
@@ -1691,7 +1191,7 @@
           <a:p>
             <a:fld id="{F93199CD-3E1B-4AE6-990F-76F925F5EA9F}" type="slidenum">
               <a:rPr lang="en-US" altLang="ko-KR" smtClean="0"/>
-              <a:t>9</a:t>
+              <a:t>7</a:t>
             </a:fld>
             <a:endParaRPr lang="en-US" altLang="ko-KR"/>
           </a:p>
@@ -1700,7 +1200,7 @@
     </p:spTree>
     <p:extLst>
       <p:ext uri="{BB962C8B-B14F-4D97-AF65-F5344CB8AC3E}">
-        <p14:creationId xmlns:p14="http://schemas.microsoft.com/office/powerpoint/2010/main" val="1415740379"/>
+        <p14:creationId xmlns:p14="http://schemas.microsoft.com/office/powerpoint/2010/main" val="2539074973"/>
       </p:ext>
     </p:extLst>
   </p:cSld>
@@ -1912,6 +1412,347 @@
             </a:r>
           </a:p>
           <a:p>
+            <a:endParaRPr lang="en-US" altLang="ko-KR" dirty="0"/>
+          </a:p>
+          <a:p>
+            <a:pPr algn="l">
+              <a:buFont typeface="+mj-lt"/>
+              <a:buAutoNum type="arabicPeriod"/>
+            </a:pPr>
+            <a:r>
+              <a:rPr lang="ko-KR" altLang="en-US" b="1" i="0" dirty="0" err="1">
+                <a:solidFill>
+                  <a:srgbClr val="374151"/>
+                </a:solidFill>
+                <a:effectLst/>
+                <a:latin typeface="Söhne"/>
+              </a:rPr>
+              <a:t>디커플링</a:t>
+            </a:r>
+            <a:r>
+              <a:rPr lang="en-US" altLang="ko-KR" b="1" i="0" dirty="0">
+                <a:solidFill>
+                  <a:srgbClr val="374151"/>
+                </a:solidFill>
+                <a:effectLst/>
+                <a:latin typeface="Söhne"/>
+              </a:rPr>
+              <a:t>(Decoupling)</a:t>
+            </a:r>
+            <a:r>
+              <a:rPr lang="en-US" altLang="ko-KR" b="0" i="0" dirty="0">
+                <a:solidFill>
+                  <a:srgbClr val="374151"/>
+                </a:solidFill>
+                <a:effectLst/>
+                <a:latin typeface="Söhne"/>
+              </a:rPr>
+              <a:t>:</a:t>
+            </a:r>
+          </a:p>
+          <a:p>
+            <a:pPr marL="742950" lvl="1" indent="-285750" algn="l">
+              <a:buFont typeface="+mj-lt"/>
+              <a:buAutoNum type="arabicPeriod"/>
+            </a:pPr>
+            <a:r>
+              <a:rPr lang="ko-KR" altLang="en-US" b="0" i="0" dirty="0">
+                <a:solidFill>
+                  <a:srgbClr val="374151"/>
+                </a:solidFill>
+                <a:effectLst/>
+                <a:latin typeface="Söhne"/>
+              </a:rPr>
+              <a:t>이벤트 발생 소스와 이벤트를 처리하는 </a:t>
+            </a:r>
+            <a:r>
+              <a:rPr lang="ko-KR" altLang="en-US" b="0" i="0" dirty="0" err="1">
+                <a:solidFill>
+                  <a:srgbClr val="374151"/>
+                </a:solidFill>
+                <a:effectLst/>
+                <a:latin typeface="Söhne"/>
+              </a:rPr>
+              <a:t>리스너</a:t>
+            </a:r>
+            <a:r>
+              <a:rPr lang="ko-KR" altLang="en-US" b="0" i="0" dirty="0">
+                <a:solidFill>
+                  <a:srgbClr val="374151"/>
+                </a:solidFill>
+                <a:effectLst/>
+                <a:latin typeface="Söhne"/>
+              </a:rPr>
+              <a:t> 사이의 종속성을 줄일 수 있습니다</a:t>
+            </a:r>
+            <a:r>
+              <a:rPr lang="en-US" altLang="ko-KR" b="0" i="0" dirty="0">
+                <a:solidFill>
+                  <a:srgbClr val="374151"/>
+                </a:solidFill>
+                <a:effectLst/>
+                <a:latin typeface="Söhne"/>
+              </a:rPr>
+              <a:t>.</a:t>
+            </a:r>
+          </a:p>
+          <a:p>
+            <a:pPr marL="742950" lvl="1" indent="-285750" algn="l">
+              <a:buFont typeface="+mj-lt"/>
+              <a:buAutoNum type="arabicPeriod"/>
+            </a:pPr>
+            <a:r>
+              <a:rPr lang="ko-KR" altLang="en-US" b="0" i="0" dirty="0">
+                <a:solidFill>
+                  <a:srgbClr val="374151"/>
+                </a:solidFill>
+                <a:effectLst/>
+                <a:latin typeface="Söhne"/>
+              </a:rPr>
+              <a:t>이로 인해 코드의 모듈성과 재사용성이 향상됩니다</a:t>
+            </a:r>
+            <a:r>
+              <a:rPr lang="en-US" altLang="ko-KR" b="0" i="0" dirty="0">
+                <a:solidFill>
+                  <a:srgbClr val="374151"/>
+                </a:solidFill>
+                <a:effectLst/>
+                <a:latin typeface="Söhne"/>
+              </a:rPr>
+              <a:t>.</a:t>
+            </a:r>
+          </a:p>
+          <a:p>
+            <a:pPr algn="l">
+              <a:buFont typeface="+mj-lt"/>
+              <a:buAutoNum type="arabicPeriod"/>
+            </a:pPr>
+            <a:r>
+              <a:rPr lang="ko-KR" altLang="en-US" b="1" i="0" dirty="0">
+                <a:solidFill>
+                  <a:srgbClr val="374151"/>
+                </a:solidFill>
+                <a:effectLst/>
+                <a:latin typeface="Söhne"/>
+              </a:rPr>
+              <a:t>유연성</a:t>
+            </a:r>
+            <a:r>
+              <a:rPr lang="en-US" altLang="ko-KR" b="0" i="0" dirty="0">
+                <a:solidFill>
+                  <a:srgbClr val="374151"/>
+                </a:solidFill>
+                <a:effectLst/>
+                <a:latin typeface="Söhne"/>
+              </a:rPr>
+              <a:t>:</a:t>
+            </a:r>
+          </a:p>
+          <a:p>
+            <a:pPr marL="742950" lvl="1" indent="-285750" algn="l">
+              <a:buFont typeface="+mj-lt"/>
+              <a:buAutoNum type="arabicPeriod"/>
+            </a:pPr>
+            <a:r>
+              <a:rPr lang="ko-KR" altLang="en-US" b="0" i="0" dirty="0" err="1">
+                <a:solidFill>
+                  <a:srgbClr val="374151"/>
+                </a:solidFill>
+                <a:effectLst/>
+                <a:latin typeface="Söhne"/>
+              </a:rPr>
+              <a:t>스크립터블</a:t>
+            </a:r>
+            <a:r>
+              <a:rPr lang="ko-KR" altLang="en-US" b="0" i="0" dirty="0">
+                <a:solidFill>
+                  <a:srgbClr val="374151"/>
+                </a:solidFill>
+                <a:effectLst/>
+                <a:latin typeface="Söhne"/>
+              </a:rPr>
+              <a:t> 오브젝트를 이용한 이벤트 시스템은 유연하게 확장 및 수정이 가능합니다</a:t>
+            </a:r>
+            <a:r>
+              <a:rPr lang="en-US" altLang="ko-KR" b="0" i="0" dirty="0">
+                <a:solidFill>
+                  <a:srgbClr val="374151"/>
+                </a:solidFill>
+                <a:effectLst/>
+                <a:latin typeface="Söhne"/>
+              </a:rPr>
+              <a:t>.</a:t>
+            </a:r>
+          </a:p>
+          <a:p>
+            <a:pPr marL="742950" lvl="1" indent="-285750" algn="l">
+              <a:buFont typeface="+mj-lt"/>
+              <a:buAutoNum type="arabicPeriod"/>
+            </a:pPr>
+            <a:r>
+              <a:rPr lang="ko-KR" altLang="en-US" b="0" i="0" dirty="0">
+                <a:solidFill>
+                  <a:srgbClr val="374151"/>
+                </a:solidFill>
+                <a:effectLst/>
+                <a:latin typeface="Söhne"/>
+              </a:rPr>
+              <a:t>다양한 이벤트와 </a:t>
+            </a:r>
+            <a:r>
+              <a:rPr lang="ko-KR" altLang="en-US" b="0" i="0" dirty="0" err="1">
+                <a:solidFill>
+                  <a:srgbClr val="374151"/>
+                </a:solidFill>
+                <a:effectLst/>
+                <a:latin typeface="Söhne"/>
+              </a:rPr>
+              <a:t>리스너를</a:t>
+            </a:r>
+            <a:r>
+              <a:rPr lang="ko-KR" altLang="en-US" b="0" i="0" dirty="0">
+                <a:solidFill>
+                  <a:srgbClr val="374151"/>
+                </a:solidFill>
+                <a:effectLst/>
+                <a:latin typeface="Söhne"/>
+              </a:rPr>
+              <a:t> 쉽게 추가하거나 변경할 수 있습니다</a:t>
+            </a:r>
+            <a:r>
+              <a:rPr lang="en-US" altLang="ko-KR" b="0" i="0" dirty="0">
+                <a:solidFill>
+                  <a:srgbClr val="374151"/>
+                </a:solidFill>
+                <a:effectLst/>
+                <a:latin typeface="Söhne"/>
+              </a:rPr>
+              <a:t>.</a:t>
+            </a:r>
+          </a:p>
+          <a:p>
+            <a:pPr algn="l">
+              <a:buFont typeface="+mj-lt"/>
+              <a:buAutoNum type="arabicPeriod"/>
+            </a:pPr>
+            <a:r>
+              <a:rPr lang="ko-KR" altLang="en-US" b="1" i="0" dirty="0">
+                <a:solidFill>
+                  <a:srgbClr val="374151"/>
+                </a:solidFill>
+                <a:effectLst/>
+                <a:latin typeface="Söhne"/>
+              </a:rPr>
+              <a:t>씬 독립성</a:t>
+            </a:r>
+            <a:r>
+              <a:rPr lang="en-US" altLang="ko-KR" b="0" i="0" dirty="0">
+                <a:solidFill>
+                  <a:srgbClr val="374151"/>
+                </a:solidFill>
+                <a:effectLst/>
+                <a:latin typeface="Söhne"/>
+              </a:rPr>
+              <a:t>:</a:t>
+            </a:r>
+          </a:p>
+          <a:p>
+            <a:pPr marL="742950" lvl="1" indent="-285750" algn="l">
+              <a:buFont typeface="+mj-lt"/>
+              <a:buAutoNum type="arabicPeriod"/>
+            </a:pPr>
+            <a:r>
+              <a:rPr lang="ko-KR" altLang="en-US" b="0" i="0" dirty="0" err="1">
+                <a:solidFill>
+                  <a:srgbClr val="374151"/>
+                </a:solidFill>
+                <a:effectLst/>
+                <a:latin typeface="Söhne"/>
+              </a:rPr>
+              <a:t>스크립터블</a:t>
+            </a:r>
+            <a:r>
+              <a:rPr lang="ko-KR" altLang="en-US" b="0" i="0" dirty="0">
+                <a:solidFill>
+                  <a:srgbClr val="374151"/>
+                </a:solidFill>
+                <a:effectLst/>
+                <a:latin typeface="Söhne"/>
+              </a:rPr>
+              <a:t> 오브젝트는 </a:t>
+            </a:r>
+            <a:r>
+              <a:rPr lang="ko-KR" altLang="en-US" b="0" i="0" dirty="0" err="1">
+                <a:solidFill>
+                  <a:srgbClr val="374151"/>
+                </a:solidFill>
+                <a:effectLst/>
+                <a:latin typeface="Söhne"/>
+              </a:rPr>
+              <a:t>씬에</a:t>
+            </a:r>
+            <a:r>
+              <a:rPr lang="ko-KR" altLang="en-US" b="0" i="0" dirty="0">
+                <a:solidFill>
+                  <a:srgbClr val="374151"/>
+                </a:solidFill>
+                <a:effectLst/>
+                <a:latin typeface="Söhne"/>
+              </a:rPr>
+              <a:t> 종속되지 않으므로</a:t>
+            </a:r>
+            <a:r>
+              <a:rPr lang="en-US" altLang="ko-KR" b="0" i="0" dirty="0">
+                <a:solidFill>
+                  <a:srgbClr val="374151"/>
+                </a:solidFill>
+                <a:effectLst/>
+                <a:latin typeface="Söhne"/>
+              </a:rPr>
+              <a:t>, </a:t>
+            </a:r>
+            <a:r>
+              <a:rPr lang="ko-KR" altLang="en-US" b="0" i="0" dirty="0">
+                <a:solidFill>
+                  <a:srgbClr val="374151"/>
+                </a:solidFill>
+                <a:effectLst/>
+                <a:latin typeface="Söhne"/>
+              </a:rPr>
+              <a:t>여러 </a:t>
+            </a:r>
+            <a:r>
+              <a:rPr lang="ko-KR" altLang="en-US" b="0" i="0" dirty="0" err="1">
+                <a:solidFill>
+                  <a:srgbClr val="374151"/>
+                </a:solidFill>
+                <a:effectLst/>
+                <a:latin typeface="Söhne"/>
+              </a:rPr>
+              <a:t>씬에서</a:t>
+            </a:r>
+            <a:r>
+              <a:rPr lang="ko-KR" altLang="en-US" b="0" i="0" dirty="0">
+                <a:solidFill>
+                  <a:srgbClr val="374151"/>
+                </a:solidFill>
+                <a:effectLst/>
+                <a:latin typeface="Söhne"/>
+              </a:rPr>
+              <a:t> 동일한 이벤트를 공유하고 처리할 수 있습니다</a:t>
+            </a:r>
+            <a:r>
+              <a:rPr lang="en-US" altLang="ko-KR" b="0" i="0" dirty="0">
+                <a:solidFill>
+                  <a:srgbClr val="374151"/>
+                </a:solidFill>
+                <a:effectLst/>
+                <a:latin typeface="Söhne"/>
+              </a:rPr>
+              <a:t>.</a:t>
+            </a:r>
+          </a:p>
+          <a:p>
             <a:endParaRPr lang="ko-KR" altLang="en-US" dirty="0"/>
           </a:p>
         </p:txBody>
@@ -1933,7 +1774,249 @@
           <a:p>
             <a:fld id="{F93199CD-3E1B-4AE6-990F-76F925F5EA9F}" type="slidenum">
               <a:rPr lang="en-US" altLang="ko-KR" smtClean="0"/>
-              <a:t>10</a:t>
+              <a:t>8</a:t>
+            </a:fld>
+            <a:endParaRPr lang="en-US" altLang="ko-KR"/>
+          </a:p>
+        </p:txBody>
+      </p:sp>
+    </p:spTree>
+    <p:extLst>
+      <p:ext uri="{BB962C8B-B14F-4D97-AF65-F5344CB8AC3E}">
+        <p14:creationId xmlns:p14="http://schemas.microsoft.com/office/powerpoint/2010/main" val="1415740379"/>
+      </p:ext>
+    </p:extLst>
+  </p:cSld>
+  <p:clrMapOvr>
+    <a:masterClrMapping/>
+  </p:clrMapOvr>
+</p:notes>
+</file>
+
+<file path=ppt/notesSlides/notesSlide6.xml><?xml version="1.0" encoding="utf-8"?>
+<p:notes xmlns:a="http://schemas.openxmlformats.org/drawingml/2006/main" xmlns:r="http://schemas.openxmlformats.org/officeDocument/2006/relationships" xmlns:p="http://schemas.openxmlformats.org/presentationml/2006/main">
+  <p:cSld>
+    <p:spTree>
+      <p:nvGrpSpPr>
+        <p:cNvPr id="1" name=""/>
+        <p:cNvGrpSpPr/>
+        <p:nvPr/>
+      </p:nvGrpSpPr>
+      <p:grpSpPr>
+        <a:xfrm>
+          <a:off x="0" y="0"/>
+          <a:ext cx="0" cy="0"/>
+          <a:chOff x="0" y="0"/>
+          <a:chExt cx="0" cy="0"/>
+        </a:xfrm>
+      </p:grpSpPr>
+      <p:sp>
+        <p:nvSpPr>
+          <p:cNvPr id="2" name="슬라이드 이미지 개체 틀 1"/>
+          <p:cNvSpPr>
+            <a:spLocks noGrp="1" noRot="1" noChangeAspect="1"/>
+          </p:cNvSpPr>
+          <p:nvPr>
+            <p:ph type="sldImg"/>
+          </p:nvPr>
+        </p:nvSpPr>
+        <p:spPr/>
+      </p:sp>
+      <p:sp>
+        <p:nvSpPr>
+          <p:cNvPr id="3" name="슬라이드 노트 개체 틀 2"/>
+          <p:cNvSpPr>
+            <a:spLocks noGrp="1"/>
+          </p:cNvSpPr>
+          <p:nvPr>
+            <p:ph type="body" idx="1"/>
+          </p:nvPr>
+        </p:nvSpPr>
+        <p:spPr/>
+        <p:txBody>
+          <a:bodyPr/>
+          <a:lstStyle/>
+          <a:p>
+            <a:pPr algn="l">
+              <a:buFont typeface="Arial" panose="020B0604020202020204" pitchFamily="34" charset="0"/>
+              <a:buChar char="•"/>
+            </a:pPr>
+            <a:r>
+              <a:rPr lang="ko-KR" altLang="en-US" b="0" i="0" dirty="0">
+                <a:solidFill>
+                  <a:srgbClr val="374151"/>
+                </a:solidFill>
+                <a:effectLst/>
+                <a:latin typeface="Söhne"/>
+              </a:rPr>
+              <a:t>메모리 효율성</a:t>
+            </a:r>
+            <a:r>
+              <a:rPr lang="en-US" altLang="ko-KR" b="0" i="0" dirty="0">
+                <a:solidFill>
+                  <a:srgbClr val="374151"/>
+                </a:solidFill>
+                <a:effectLst/>
+                <a:latin typeface="Söhne"/>
+              </a:rPr>
+              <a:t>: Scene</a:t>
+            </a:r>
+            <a:r>
+              <a:rPr lang="ko-KR" altLang="en-US" b="0" i="0" dirty="0">
+                <a:solidFill>
+                  <a:srgbClr val="374151"/>
+                </a:solidFill>
+                <a:effectLst/>
+                <a:latin typeface="Söhne"/>
+              </a:rPr>
+              <a:t>이 변경되어도 데이터가 유지되므로</a:t>
+            </a:r>
+            <a:r>
+              <a:rPr lang="en-US" altLang="ko-KR" b="0" i="0" dirty="0">
+                <a:solidFill>
+                  <a:srgbClr val="374151"/>
+                </a:solidFill>
+                <a:effectLst/>
+                <a:latin typeface="Söhne"/>
+              </a:rPr>
+              <a:t>, </a:t>
+            </a:r>
+            <a:r>
+              <a:rPr lang="ko-KR" altLang="en-US" b="0" i="0" dirty="0">
+                <a:solidFill>
+                  <a:srgbClr val="374151"/>
+                </a:solidFill>
+                <a:effectLst/>
+                <a:latin typeface="Söhne"/>
+              </a:rPr>
+              <a:t>메모리 사용이 효율적입니다</a:t>
+            </a:r>
+            <a:r>
+              <a:rPr lang="en-US" altLang="ko-KR" b="0" i="0" dirty="0">
+                <a:solidFill>
+                  <a:srgbClr val="374151"/>
+                </a:solidFill>
+                <a:effectLst/>
+                <a:latin typeface="Söhne"/>
+              </a:rPr>
+              <a:t>.</a:t>
+            </a:r>
+          </a:p>
+          <a:p>
+            <a:pPr algn="l">
+              <a:buFont typeface="Arial" panose="020B0604020202020204" pitchFamily="34" charset="0"/>
+              <a:buChar char="•"/>
+            </a:pPr>
+            <a:r>
+              <a:rPr lang="ko-KR" altLang="en-US" b="0" i="0" dirty="0">
+                <a:solidFill>
+                  <a:srgbClr val="374151"/>
+                </a:solidFill>
+                <a:effectLst/>
+                <a:latin typeface="Söhne"/>
+              </a:rPr>
+              <a:t>재사용성</a:t>
+            </a:r>
+            <a:r>
+              <a:rPr lang="en-US" altLang="ko-KR" b="0" i="0" dirty="0">
+                <a:solidFill>
+                  <a:srgbClr val="374151"/>
+                </a:solidFill>
+                <a:effectLst/>
+                <a:latin typeface="Söhne"/>
+              </a:rPr>
+              <a:t>: </a:t>
+            </a:r>
+            <a:r>
+              <a:rPr lang="ko-KR" altLang="en-US" b="0" i="0" dirty="0">
+                <a:solidFill>
+                  <a:srgbClr val="374151"/>
+                </a:solidFill>
+                <a:effectLst/>
+                <a:latin typeface="Söhne"/>
+              </a:rPr>
+              <a:t>동일한 데이터를 여러 게임 오브젝트에서 재사용할 수 있습니다</a:t>
+            </a:r>
+            <a:r>
+              <a:rPr lang="en-US" altLang="ko-KR" b="0" i="0" dirty="0">
+                <a:solidFill>
+                  <a:srgbClr val="374151"/>
+                </a:solidFill>
+                <a:effectLst/>
+                <a:latin typeface="Söhne"/>
+              </a:rPr>
+              <a:t>.</a:t>
+            </a:r>
+          </a:p>
+          <a:p>
+            <a:pPr algn="l">
+              <a:buFont typeface="Arial" panose="020B0604020202020204" pitchFamily="34" charset="0"/>
+              <a:buChar char="•"/>
+            </a:pPr>
+            <a:r>
+              <a:rPr lang="ko-KR" altLang="en-US" b="0" i="0" dirty="0">
+                <a:solidFill>
+                  <a:srgbClr val="374151"/>
+                </a:solidFill>
+                <a:effectLst/>
+                <a:latin typeface="Söhne"/>
+              </a:rPr>
+              <a:t>확장성</a:t>
+            </a:r>
+            <a:r>
+              <a:rPr lang="en-US" altLang="ko-KR" b="0" i="0" dirty="0">
+                <a:solidFill>
+                  <a:srgbClr val="374151"/>
+                </a:solidFill>
+                <a:effectLst/>
+                <a:latin typeface="Söhne"/>
+              </a:rPr>
+              <a:t>: </a:t>
+            </a:r>
+            <a:r>
+              <a:rPr lang="ko-KR" altLang="en-US" b="0" i="0" dirty="0">
+                <a:solidFill>
+                  <a:srgbClr val="374151"/>
+                </a:solidFill>
+                <a:effectLst/>
+                <a:latin typeface="Söhne"/>
+              </a:rPr>
+              <a:t>데이터 구조를 쉽게 확장하고 수정할 수 있습니다</a:t>
+            </a:r>
+            <a:r>
+              <a:rPr lang="en-US" altLang="ko-KR" b="0" i="0" dirty="0">
+                <a:solidFill>
+                  <a:srgbClr val="374151"/>
+                </a:solidFill>
+                <a:effectLst/>
+                <a:latin typeface="Söhne"/>
+              </a:rPr>
+              <a:t>.</a:t>
+            </a:r>
+          </a:p>
+          <a:p>
+            <a:endParaRPr lang="ko-KR" altLang="en-US" dirty="0"/>
+          </a:p>
+        </p:txBody>
+      </p:sp>
+      <p:sp>
+        <p:nvSpPr>
+          <p:cNvPr id="4" name="슬라이드 번호 개체 틀 3"/>
+          <p:cNvSpPr>
+            <a:spLocks noGrp="1"/>
+          </p:cNvSpPr>
+          <p:nvPr>
+            <p:ph type="sldNum" sz="quarter" idx="5"/>
+          </p:nvPr>
+        </p:nvSpPr>
+        <p:spPr/>
+        <p:txBody>
+          <a:bodyPr/>
+          <a:lstStyle/>
+          <a:p>
+            <a:fld id="{F93199CD-3E1B-4AE6-990F-76F925F5EA9F}" type="slidenum">
+              <a:rPr lang="en-US" altLang="ko-KR" smtClean="0"/>
+              <a:t>9</a:t>
             </a:fld>
             <a:endParaRPr lang="en-US" altLang="ko-KR"/>
           </a:p>
@@ -2299,7 +2382,7 @@
           <a:p>
             <a:fld id="{03F41C87-7AD9-4845-A077-840E4A0F3F06}" type="datetimeFigureOut">
               <a:rPr lang="en-US"/>
-              <a:t>9/24/2023</a:t>
+              <a:t>9/25/2023</a:t>
             </a:fld>
             <a:endParaRPr/>
           </a:p>
@@ -2491,7 +2574,7 @@
           <a:p>
             <a:fld id="{03F41C87-7AD9-4845-A077-840E4A0F3F06}" type="datetimeFigureOut">
               <a:rPr lang="en-US"/>
-              <a:t>9/24/2023</a:t>
+              <a:t>9/25/2023</a:t>
             </a:fld>
             <a:endParaRPr/>
           </a:p>
@@ -2680,7 +2763,7 @@
           <a:p>
             <a:fld id="{03F41C87-7AD9-4845-A077-840E4A0F3F06}" type="datetimeFigureOut">
               <a:rPr lang="en-US"/>
-              <a:t>9/24/2023</a:t>
+              <a:t>9/25/2023</a:t>
             </a:fld>
             <a:endParaRPr/>
           </a:p>
@@ -2960,7 +3043,7 @@
           <a:p>
             <a:fld id="{03F41C87-7AD9-4845-A077-840E4A0F3F06}" type="datetimeFigureOut">
               <a:rPr lang="en-US"/>
-              <a:t>9/24/2023</a:t>
+              <a:t>9/25/2023</a:t>
             </a:fld>
             <a:endParaRPr/>
           </a:p>
@@ -3264,7 +3347,7 @@
           <a:p>
             <a:fld id="{03F41C87-7AD9-4845-A077-840E4A0F3F06}" type="datetimeFigureOut">
               <a:rPr lang="en-US"/>
-              <a:t>9/24/2023</a:t>
+              <a:t>9/25/2023</a:t>
             </a:fld>
             <a:endParaRPr/>
           </a:p>
@@ -3720,7 +3803,7 @@
           <a:p>
             <a:fld id="{03F41C87-7AD9-4845-A077-840E4A0F3F06}" type="datetimeFigureOut">
               <a:rPr lang="en-US"/>
-              <a:t>9/24/2023</a:t>
+              <a:t>9/25/2023</a:t>
             </a:fld>
             <a:endParaRPr/>
           </a:p>
@@ -3850,7 +3933,7 @@
           <a:p>
             <a:fld id="{03F41C87-7AD9-4845-A077-840E4A0F3F06}" type="datetimeFigureOut">
               <a:rPr lang="en-US"/>
-              <a:t>9/24/2023</a:t>
+              <a:t>9/25/2023</a:t>
             </a:fld>
             <a:endParaRPr/>
           </a:p>
@@ -3965,7 +4048,7 @@
           <a:p>
             <a:fld id="{03F41C87-7AD9-4845-A077-840E4A0F3F06}" type="datetimeFigureOut">
               <a:rPr lang="en-US"/>
-              <a:t>9/24/2023</a:t>
+              <a:t>9/25/2023</a:t>
             </a:fld>
             <a:endParaRPr/>
           </a:p>
@@ -4287,7 +4370,7 @@
           <a:p>
             <a:fld id="{03F41C87-7AD9-4845-A077-840E4A0F3F06}" type="datetimeFigureOut">
               <a:rPr lang="en-US"/>
-              <a:t>9/24/2023</a:t>
+              <a:t>9/25/2023</a:t>
             </a:fld>
             <a:endParaRPr/>
           </a:p>
@@ -4599,7 +4682,7 @@
             <a:fld id="{03F41C87-7AD9-4845-A077-840E4A0F3F06}" type="datetimeFigureOut">
               <a:rPr lang="en-US"/>
               <a:pPr/>
-              <a:t>9/24/2023</a:t>
+              <a:t>9/25/2023</a:t>
             </a:fld>
             <a:endParaRPr/>
           </a:p>
@@ -4853,7 +4936,7 @@
             <a:fld id="{03F41C87-7AD9-4845-A077-840E4A0F3F06}" type="datetimeFigureOut">
               <a:rPr lang="en-US" smtClean="0"/>
               <a:pPr/>
-              <a:t>9/24/2023</a:t>
+              <a:t>9/25/2023</a:t>
             </a:fld>
             <a:endParaRPr lang="en-US"/>
           </a:p>
@@ -5347,125 +5430,6 @@
 </p:sld>
 </file>
 
-<file path=ppt/slides/slide10.xml><?xml version="1.0" encoding="utf-8"?>
-<p:sld xmlns:a="http://schemas.openxmlformats.org/drawingml/2006/main" xmlns:r="http://schemas.openxmlformats.org/officeDocument/2006/relationships" xmlns:p="http://schemas.openxmlformats.org/presentationml/2006/main">
-  <p:cSld>
-    <p:spTree>
-      <p:nvGrpSpPr>
-        <p:cNvPr id="1" name=""/>
-        <p:cNvGrpSpPr/>
-        <p:nvPr/>
-      </p:nvGrpSpPr>
-      <p:grpSpPr>
-        <a:xfrm>
-          <a:off x="0" y="0"/>
-          <a:ext cx="0" cy="0"/>
-          <a:chOff x="0" y="0"/>
-          <a:chExt cx="0" cy="0"/>
-        </a:xfrm>
-      </p:grpSpPr>
-      <p:sp>
-        <p:nvSpPr>
-          <p:cNvPr id="2" name="Title 1">
-            <a:extLst>
-              <a:ext uri="{FF2B5EF4-FFF2-40B4-BE49-F238E27FC236}">
-                <a16:creationId xmlns:a16="http://schemas.microsoft.com/office/drawing/2014/main" id="{A7F5E160-4E42-4FCC-9B4E-9574CD651EEE}"/>
-              </a:ext>
-            </a:extLst>
-          </p:cNvPr>
-          <p:cNvSpPr>
-            <a:spLocks noGrp="1"/>
-          </p:cNvSpPr>
-          <p:nvPr>
-            <p:ph type="title"/>
-          </p:nvPr>
-        </p:nvSpPr>
-        <p:spPr>
-          <a:xfrm>
-            <a:off x="912812" y="228600"/>
-            <a:ext cx="9144001" cy="1371600"/>
-          </a:xfrm>
-        </p:spPr>
-        <p:txBody>
-          <a:bodyPr/>
-          <a:lstStyle/>
-          <a:p>
-            <a:r>
-              <a:rPr lang="en-US" dirty="0"/>
-              <a:t>Be cautious</a:t>
-            </a:r>
-          </a:p>
-        </p:txBody>
-      </p:sp>
-      <p:sp>
-        <p:nvSpPr>
-          <p:cNvPr id="3" name="Content Placeholder 2">
-            <a:extLst>
-              <a:ext uri="{FF2B5EF4-FFF2-40B4-BE49-F238E27FC236}">
-                <a16:creationId xmlns:a16="http://schemas.microsoft.com/office/drawing/2014/main" id="{AE76CEDF-7A2B-443E-BB9D-5A6E793670A8}"/>
-              </a:ext>
-            </a:extLst>
-          </p:cNvPr>
-          <p:cNvSpPr>
-            <a:spLocks noGrp="1"/>
-          </p:cNvSpPr>
-          <p:nvPr>
-            <p:ph idx="1"/>
-          </p:nvPr>
-        </p:nvSpPr>
-        <p:spPr>
-          <a:xfrm>
-            <a:off x="946602" y="1905000"/>
-            <a:ext cx="10177009" cy="4114801"/>
-          </a:xfrm>
-        </p:spPr>
-        <p:txBody>
-          <a:bodyPr>
-            <a:normAutofit/>
-          </a:bodyPr>
-          <a:lstStyle/>
-          <a:p>
-            <a:pPr marL="0" indent="0">
-              <a:buNone/>
-            </a:pPr>
-            <a:r>
-              <a:rPr lang="en-US" altLang="ko-KR" dirty="0"/>
-              <a:t>Immutability : The data doesn’t change nor reset the value. So use the data that the value doesn’t change throughout the game. (It’s not used for player character! )</a:t>
-            </a:r>
-          </a:p>
-          <a:p>
-            <a:pPr marL="0" indent="0">
-              <a:buNone/>
-            </a:pPr>
-            <a:endParaRPr lang="en-US" altLang="ko-KR" dirty="0"/>
-          </a:p>
-        </p:txBody>
-      </p:sp>
-    </p:spTree>
-    <p:extLst>
-      <p:ext uri="{BB962C8B-B14F-4D97-AF65-F5344CB8AC3E}">
-        <p14:creationId xmlns:p14="http://schemas.microsoft.com/office/powerpoint/2010/main" val="3516388140"/>
-      </p:ext>
-    </p:extLst>
-  </p:cSld>
-  <p:clrMapOvr>
-    <a:masterClrMapping/>
-  </p:clrMapOvr>
-  <mc:AlternateContent xmlns:mc="http://schemas.openxmlformats.org/markup-compatibility/2006">
-    <mc:Choice xmlns:p14="http://schemas.microsoft.com/office/powerpoint/2010/main" Requires="p14">
-      <p:transition spd="med" p14:dur="700">
-        <p:fade/>
-      </p:transition>
-    </mc:Choice>
-    <mc:Fallback>
-      <p:transition spd="med">
-        <p:fade/>
-      </p:transition>
-    </mc:Fallback>
-  </mc:AlternateContent>
-</p:sld>
-</file>
-
 <file path=ppt/slides/slide2.xml><?xml version="1.0" encoding="utf-8"?>
 <p:sld xmlns:a="http://schemas.openxmlformats.org/drawingml/2006/main" xmlns:r="http://schemas.openxmlformats.org/officeDocument/2006/relationships" xmlns:p="http://schemas.openxmlformats.org/presentationml/2006/main">
   <p:cSld>
@@ -5549,14 +5513,8 @@
             </a:pPr>
             <a:r>
               <a:rPr lang="en-US" dirty="0"/>
-              <a:t>Scriptable Object is a “Data Container” for large amount of data independent of class instance. </a:t>
-            </a:r>
-          </a:p>
-          <a:p>
-            <a:pPr marL="0" indent="0">
-              <a:buNone/>
-            </a:pPr>
-            <a:endParaRPr lang="en-US" dirty="0"/>
+              <a:t>Scriptable Object is a “Data Container” for large amount of data and manage them in one place</a:t>
+            </a:r>
           </a:p>
           <a:p>
             <a:pPr marL="0" indent="0">
@@ -5580,7 +5538,7 @@
         </p:nvSpPr>
         <p:spPr>
           <a:xfrm>
-            <a:off x="1865310" y="3433603"/>
+            <a:off x="2132012" y="3433603"/>
             <a:ext cx="2514600" cy="2438400"/>
           </a:xfrm>
           <a:prstGeom prst="roundRect">
@@ -5626,7 +5584,7 @@
         </p:nvSpPr>
         <p:spPr>
           <a:xfrm>
-            <a:off x="2170110" y="3662203"/>
+            <a:off x="2436812" y="3662203"/>
             <a:ext cx="1905000" cy="304800"/>
           </a:xfrm>
           <a:prstGeom prst="roundRect">
@@ -5690,7 +5648,7 @@
         </p:nvSpPr>
         <p:spPr>
           <a:xfrm>
-            <a:off x="2178239" y="4081304"/>
+            <a:off x="2444941" y="4081304"/>
             <a:ext cx="1905000" cy="304800"/>
           </a:xfrm>
           <a:prstGeom prst="roundRect">
@@ -5754,7 +5712,7 @@
         </p:nvSpPr>
         <p:spPr>
           <a:xfrm>
-            <a:off x="2178239" y="2976403"/>
+            <a:off x="2444941" y="2976403"/>
             <a:ext cx="1905000" cy="304800"/>
           </a:xfrm>
           <a:prstGeom prst="roundRect">
@@ -5823,7 +5781,7 @@
         </p:nvSpPr>
         <p:spPr>
           <a:xfrm>
-            <a:off x="2170110" y="4495928"/>
+            <a:off x="2436812" y="4495928"/>
             <a:ext cx="1905000" cy="304800"/>
           </a:xfrm>
           <a:prstGeom prst="roundRect">
@@ -5887,7 +5845,7 @@
         </p:nvSpPr>
         <p:spPr>
           <a:xfrm>
-            <a:off x="2187956" y="4910552"/>
+            <a:off x="2454658" y="4910552"/>
             <a:ext cx="1905000" cy="304800"/>
           </a:xfrm>
           <a:prstGeom prst="roundRect">
@@ -5951,7 +5909,7 @@
         </p:nvSpPr>
         <p:spPr>
           <a:xfrm>
-            <a:off x="2188414" y="5325176"/>
+            <a:off x="2455116" y="5325176"/>
             <a:ext cx="1905000" cy="304800"/>
           </a:xfrm>
           <a:prstGeom prst="roundRect">
@@ -6015,7 +5973,7 @@
         </p:nvSpPr>
         <p:spPr>
           <a:xfrm>
-            <a:off x="7542212" y="3429000"/>
+            <a:off x="7389812" y="3429000"/>
             <a:ext cx="2514600" cy="2438400"/>
           </a:xfrm>
           <a:prstGeom prst="roundRect">
@@ -6061,7 +6019,7 @@
         </p:nvSpPr>
         <p:spPr>
           <a:xfrm>
-            <a:off x="7847012" y="3657600"/>
+            <a:off x="7694612" y="3657600"/>
             <a:ext cx="1905000" cy="304800"/>
           </a:xfrm>
           <a:prstGeom prst="roundRect">
@@ -6125,7 +6083,7 @@
         </p:nvSpPr>
         <p:spPr>
           <a:xfrm>
-            <a:off x="7855141" y="4076701"/>
+            <a:off x="7702741" y="4076701"/>
             <a:ext cx="1905000" cy="304800"/>
           </a:xfrm>
           <a:prstGeom prst="roundRect">
@@ -6189,7 +6147,7 @@
         </p:nvSpPr>
         <p:spPr>
           <a:xfrm>
-            <a:off x="7855141" y="2971800"/>
+            <a:off x="7702741" y="2971800"/>
             <a:ext cx="1905000" cy="304800"/>
           </a:xfrm>
           <a:prstGeom prst="roundRect">
@@ -6257,7 +6215,7 @@
         </p:nvSpPr>
         <p:spPr>
           <a:xfrm>
-            <a:off x="7847012" y="4491325"/>
+            <a:off x="7694612" y="4491325"/>
             <a:ext cx="1905000" cy="304800"/>
           </a:xfrm>
           <a:prstGeom prst="roundRect">
@@ -6321,7 +6279,7 @@
         </p:nvSpPr>
         <p:spPr>
           <a:xfrm>
-            <a:off x="7864858" y="4905949"/>
+            <a:off x="7712458" y="4905949"/>
             <a:ext cx="1905000" cy="304800"/>
           </a:xfrm>
           <a:prstGeom prst="roundRect">
@@ -6385,7 +6343,7 @@
         </p:nvSpPr>
         <p:spPr>
           <a:xfrm>
-            <a:off x="7865316" y="5320573"/>
+            <a:off x="7712916" y="5320573"/>
             <a:ext cx="1905000" cy="304800"/>
           </a:xfrm>
           <a:prstGeom prst="roundRect">
@@ -7635,7 +7593,7 @@
           <p:nvPr/>
         </p:nvPicPr>
         <p:blipFill>
-          <a:blip r:embed="rId2"/>
+          <a:blip r:embed="rId3"/>
           <a:stretch>
             <a:fillRect/>
           </a:stretch>
@@ -8166,7 +8124,7 @@
           <a:p>
             <a:r>
               <a:rPr lang="en-US" dirty="0"/>
-              <a:t>Example of Scriptable Object Usage</a:t>
+              <a:t>Scriptable Object vs JSON</a:t>
             </a:r>
           </a:p>
         </p:txBody>
@@ -8189,8 +8147,8 @@
         </p:nvSpPr>
         <p:spPr>
           <a:xfrm>
-            <a:off x="8380412" y="1828800"/>
-            <a:ext cx="3200400" cy="4114801"/>
+            <a:off x="946602" y="1905000"/>
+            <a:ext cx="3700009" cy="4114801"/>
           </a:xfrm>
         </p:spPr>
         <p:txBody>
@@ -8204,45 +8162,327 @@
             </a:pPr>
             <a:r>
               <a:rPr lang="en-US" dirty="0"/>
-              <a:t>When interact, create the food item.</a:t>
-            </a:r>
-          </a:p>
-        </p:txBody>
-      </p:sp>
-      <p:pic>
-        <p:nvPicPr>
-          <p:cNvPr id="7" name="그림 6">
+              <a:t>Scriptable Object</a:t>
+            </a:r>
+          </a:p>
+          <a:p>
+            <a:pPr marL="0" indent="0">
+              <a:buNone/>
+            </a:pPr>
+            <a:r>
+              <a:rPr lang="en-US" dirty="0"/>
+              <a:t>- Flexible to use </a:t>
+            </a:r>
+          </a:p>
+          <a:p>
+            <a:pPr marL="0" indent="0">
+              <a:buNone/>
+            </a:pPr>
+            <a:r>
+              <a:rPr lang="en-US" altLang="ko-KR" dirty="0"/>
+              <a:t>- Support all datatypes in C# and Unity</a:t>
+            </a:r>
+          </a:p>
+          <a:p>
+            <a:pPr marL="0" indent="0">
+              <a:buNone/>
+            </a:pPr>
+            <a:endParaRPr lang="en-US" dirty="0"/>
+          </a:p>
+        </p:txBody>
+      </p:sp>
+      <p:sp>
+        <p:nvSpPr>
+          <p:cNvPr id="4" name="Content Placeholder 2">
             <a:extLst>
               <a:ext uri="{FF2B5EF4-FFF2-40B4-BE49-F238E27FC236}">
-                <a16:creationId xmlns:a16="http://schemas.microsoft.com/office/drawing/2014/main" id="{47A4337D-2645-CFBF-FF03-CAABEAD36CF5}"/>
+                <a16:creationId xmlns:a16="http://schemas.microsoft.com/office/drawing/2014/main" id="{C6BD65BD-48C6-5CFF-2A1F-304B3989A4EC}"/>
               </a:ext>
             </a:extLst>
           </p:cNvPr>
-          <p:cNvPicPr>
-            <a:picLocks noChangeAspect="1"/>
-          </p:cNvPicPr>
+          <p:cNvSpPr txBox="1">
+            <a:spLocks/>
+          </p:cNvSpPr>
           <p:nvPr/>
-        </p:nvPicPr>
-        <p:blipFill>
-          <a:blip r:embed="rId2"/>
-          <a:stretch>
-            <a:fillRect/>
-          </a:stretch>
-        </p:blipFill>
+        </p:nvSpPr>
         <p:spPr>
           <a:xfrm>
-            <a:off x="949002" y="1762246"/>
-            <a:ext cx="7236056" cy="4438796"/>
+            <a:off x="5513160" y="1905000"/>
+            <a:ext cx="3476852" cy="4114801"/>
           </a:xfrm>
           <a:prstGeom prst="rect">
             <a:avLst/>
           </a:prstGeom>
         </p:spPr>
-      </p:pic>
+        <p:txBody>
+          <a:bodyPr vert="horz" lIns="91440" tIns="45720" rIns="91440" bIns="45720" rtlCol="0">
+            <a:normAutofit/>
+          </a:bodyPr>
+          <a:lstStyle>
+            <a:lvl1pPr marL="223838" indent="-223838" algn="l" defTabSz="914400" rtl="0" eaLnBrk="1" latinLnBrk="0" hangingPunct="1">
+              <a:lnSpc>
+                <a:spcPct val="90000"/>
+              </a:lnSpc>
+              <a:spcBef>
+                <a:spcPts val="1800"/>
+              </a:spcBef>
+              <a:buClr>
+                <a:schemeClr val="accent1"/>
+              </a:buClr>
+              <a:buSzPct val="100000"/>
+              <a:buFont typeface="Arial" pitchFamily="34" charset="0"/>
+              <a:buChar char="•"/>
+              <a:defRPr sz="2400" kern="1200">
+                <a:solidFill>
+                  <a:schemeClr val="tx1"/>
+                </a:solidFill>
+                <a:latin typeface="+mn-lt"/>
+                <a:ea typeface="+mn-ea"/>
+                <a:cs typeface="+mn-cs"/>
+              </a:defRPr>
+            </a:lvl1pPr>
+            <a:lvl2pPr marL="463550" indent="-231775" algn="l" defTabSz="914400" rtl="0" eaLnBrk="1" latinLnBrk="0" hangingPunct="1">
+              <a:lnSpc>
+                <a:spcPct val="90000"/>
+              </a:lnSpc>
+              <a:spcBef>
+                <a:spcPts val="1200"/>
+              </a:spcBef>
+              <a:buClr>
+                <a:schemeClr val="accent1"/>
+              </a:buClr>
+              <a:buSzPct val="100000"/>
+              <a:buFont typeface="Arial" pitchFamily="34" charset="0"/>
+              <a:buChar char="•"/>
+              <a:defRPr sz="2000" kern="1200">
+                <a:solidFill>
+                  <a:schemeClr val="tx1"/>
+                </a:solidFill>
+                <a:latin typeface="+mn-lt"/>
+                <a:ea typeface="+mn-ea"/>
+                <a:cs typeface="+mn-cs"/>
+              </a:defRPr>
+            </a:lvl2pPr>
+            <a:lvl3pPr marL="682625" indent="-219075" algn="l" defTabSz="914400" rtl="0" eaLnBrk="1" latinLnBrk="0" hangingPunct="1">
+              <a:lnSpc>
+                <a:spcPct val="90000"/>
+              </a:lnSpc>
+              <a:spcBef>
+                <a:spcPts val="600"/>
+              </a:spcBef>
+              <a:buClr>
+                <a:schemeClr val="accent1"/>
+              </a:buClr>
+              <a:buSzPct val="100000"/>
+              <a:buFont typeface="Arial" pitchFamily="34" charset="0"/>
+              <a:buChar char="•"/>
+              <a:defRPr sz="1800" kern="1200">
+                <a:solidFill>
+                  <a:schemeClr val="tx1"/>
+                </a:solidFill>
+                <a:latin typeface="+mn-lt"/>
+                <a:ea typeface="+mn-ea"/>
+                <a:cs typeface="+mn-cs"/>
+              </a:defRPr>
+            </a:lvl3pPr>
+            <a:lvl4pPr marL="857250" indent="-174625" algn="l" defTabSz="914400" rtl="0" eaLnBrk="1" latinLnBrk="0" hangingPunct="1">
+              <a:lnSpc>
+                <a:spcPct val="90000"/>
+              </a:lnSpc>
+              <a:spcBef>
+                <a:spcPts val="600"/>
+              </a:spcBef>
+              <a:buClr>
+                <a:schemeClr val="accent1"/>
+              </a:buClr>
+              <a:buSzPct val="100000"/>
+              <a:buFont typeface="Arial" pitchFamily="34" charset="0"/>
+              <a:buChar char="•"/>
+              <a:defRPr sz="1600" kern="1200">
+                <a:solidFill>
+                  <a:schemeClr val="tx1"/>
+                </a:solidFill>
+                <a:latin typeface="+mn-lt"/>
+                <a:ea typeface="+mn-ea"/>
+                <a:cs typeface="+mn-cs"/>
+              </a:defRPr>
+            </a:lvl4pPr>
+            <a:lvl5pPr marL="1030288" indent="-173038" algn="l" defTabSz="914400" rtl="0" eaLnBrk="1" latinLnBrk="0" hangingPunct="1">
+              <a:lnSpc>
+                <a:spcPct val="90000"/>
+              </a:lnSpc>
+              <a:spcBef>
+                <a:spcPts val="600"/>
+              </a:spcBef>
+              <a:buClr>
+                <a:schemeClr val="accent1"/>
+              </a:buClr>
+              <a:buSzPct val="100000"/>
+              <a:buFont typeface="Arial" pitchFamily="34" charset="0"/>
+              <a:buChar char="•"/>
+              <a:defRPr sz="1600" kern="1200">
+                <a:solidFill>
+                  <a:schemeClr val="tx1"/>
+                </a:solidFill>
+                <a:latin typeface="+mn-lt"/>
+                <a:ea typeface="+mn-ea"/>
+                <a:cs typeface="+mn-cs"/>
+              </a:defRPr>
+            </a:lvl5pPr>
+            <a:lvl6pPr marL="1207008" indent="-173736" algn="l" defTabSz="914400" rtl="0" eaLnBrk="1" latinLnBrk="0" hangingPunct="1">
+              <a:spcBef>
+                <a:spcPts val="600"/>
+              </a:spcBef>
+              <a:buClr>
+                <a:schemeClr val="accent1"/>
+              </a:buClr>
+              <a:buFont typeface="Arial" pitchFamily="34" charset="0"/>
+              <a:buChar char="•"/>
+              <a:defRPr sz="1600" kern="1200">
+                <a:solidFill>
+                  <a:schemeClr val="tx1"/>
+                </a:solidFill>
+                <a:latin typeface="+mn-lt"/>
+                <a:ea typeface="+mn-ea"/>
+                <a:cs typeface="+mn-cs"/>
+              </a:defRPr>
+            </a:lvl6pPr>
+            <a:lvl7pPr marL="1380744" indent="-173736" algn="l" defTabSz="914400" rtl="0" eaLnBrk="1" latinLnBrk="0" hangingPunct="1">
+              <a:spcBef>
+                <a:spcPts val="600"/>
+              </a:spcBef>
+              <a:buClr>
+                <a:schemeClr val="accent1"/>
+              </a:buClr>
+              <a:buFont typeface="Arial" pitchFamily="34" charset="0"/>
+              <a:buChar char="•"/>
+              <a:defRPr sz="1600" kern="1200">
+                <a:solidFill>
+                  <a:schemeClr val="tx1"/>
+                </a:solidFill>
+                <a:latin typeface="+mn-lt"/>
+                <a:ea typeface="+mn-ea"/>
+                <a:cs typeface="+mn-cs"/>
+              </a:defRPr>
+            </a:lvl7pPr>
+            <a:lvl8pPr marL="1554480" indent="-173736" algn="l" defTabSz="914400" rtl="0" eaLnBrk="1" latinLnBrk="0" hangingPunct="1">
+              <a:spcBef>
+                <a:spcPts val="600"/>
+              </a:spcBef>
+              <a:buClr>
+                <a:schemeClr val="accent1"/>
+              </a:buClr>
+              <a:buFont typeface="Arial" pitchFamily="34" charset="0"/>
+              <a:buChar char="•"/>
+              <a:defRPr sz="1600" kern="1200">
+                <a:solidFill>
+                  <a:schemeClr val="tx1"/>
+                </a:solidFill>
+                <a:latin typeface="+mn-lt"/>
+                <a:ea typeface="+mn-ea"/>
+                <a:cs typeface="+mn-cs"/>
+              </a:defRPr>
+            </a:lvl8pPr>
+            <a:lvl9pPr marL="1728216" indent="-173736" algn="l" defTabSz="914400" rtl="0" eaLnBrk="1" latinLnBrk="0" hangingPunct="1">
+              <a:spcBef>
+                <a:spcPts val="600"/>
+              </a:spcBef>
+              <a:buClr>
+                <a:schemeClr val="accent1"/>
+              </a:buClr>
+              <a:buFont typeface="Arial" pitchFamily="34" charset="0"/>
+              <a:buChar char="•"/>
+              <a:defRPr sz="1600" kern="1200">
+                <a:solidFill>
+                  <a:schemeClr val="tx1"/>
+                </a:solidFill>
+                <a:latin typeface="+mn-lt"/>
+                <a:ea typeface="+mn-ea"/>
+                <a:cs typeface="+mn-cs"/>
+              </a:defRPr>
+            </a:lvl9pPr>
+          </a:lstStyle>
+          <a:p>
+            <a:pPr marL="0" indent="0">
+              <a:buFont typeface="Arial" pitchFamily="34" charset="0"/>
+              <a:buNone/>
+            </a:pPr>
+            <a:r>
+              <a:rPr lang="en-US" altLang="ko-KR" dirty="0"/>
+              <a:t>JSON</a:t>
+            </a:r>
+          </a:p>
+          <a:p>
+            <a:pPr marL="0" indent="0">
+              <a:buFont typeface="Arial" pitchFamily="34" charset="0"/>
+              <a:buNone/>
+            </a:pPr>
+            <a:r>
+              <a:rPr lang="en-US" altLang="ko-KR" dirty="0"/>
+              <a:t>- Text Based</a:t>
+            </a:r>
+          </a:p>
+          <a:p>
+            <a:pPr marL="0" indent="0">
+              <a:buFont typeface="Arial" pitchFamily="34" charset="0"/>
+              <a:buNone/>
+            </a:pPr>
+            <a:r>
+              <a:rPr lang="en-US" dirty="0"/>
+              <a:t>- Useful for Save &amp; Load</a:t>
+            </a:r>
+            <a:endParaRPr lang="en-US" altLang="ko-KR" dirty="0"/>
+          </a:p>
+          <a:p>
+            <a:pPr marL="0" indent="0">
+              <a:buFont typeface="Arial" pitchFamily="34" charset="0"/>
+              <a:buNone/>
+            </a:pPr>
+            <a:r>
+              <a:rPr lang="en-US" altLang="ko-KR" dirty="0"/>
+              <a:t>- Useful for large projects</a:t>
+            </a:r>
+            <a:r>
+              <a:rPr lang="ko-KR" altLang="en-US" dirty="0"/>
+              <a:t> </a:t>
+            </a:r>
+            <a:endParaRPr lang="en-US" altLang="ko-KR" dirty="0"/>
+          </a:p>
+          <a:p>
+            <a:pPr marL="0" indent="0">
+              <a:buFont typeface="Arial" pitchFamily="34" charset="0"/>
+              <a:buNone/>
+            </a:pPr>
+            <a:r>
+              <a:rPr lang="en-US" dirty="0"/>
+              <a:t>- Manage data in excel</a:t>
+            </a:r>
+          </a:p>
+          <a:p>
+            <a:pPr marL="0" indent="0">
+              <a:buNone/>
+            </a:pPr>
+            <a:r>
+              <a:rPr lang="en-US" altLang="ko-KR" dirty="0"/>
+              <a:t>- Support basic datatypes</a:t>
+            </a:r>
+          </a:p>
+          <a:p>
+            <a:pPr marL="0" indent="0">
+              <a:buFont typeface="Arial" pitchFamily="34" charset="0"/>
+              <a:buNone/>
+            </a:pPr>
+            <a:r>
+              <a:rPr lang="en-US" dirty="0"/>
+              <a:t> </a:t>
+            </a:r>
+          </a:p>
+        </p:txBody>
+      </p:sp>
     </p:spTree>
     <p:extLst>
       <p:ext uri="{BB962C8B-B14F-4D97-AF65-F5344CB8AC3E}">
-        <p14:creationId xmlns:p14="http://schemas.microsoft.com/office/powerpoint/2010/main" val="1458716332"/>
+        <p14:creationId xmlns:p14="http://schemas.microsoft.com/office/powerpoint/2010/main" val="2193125552"/>
       </p:ext>
     </p:extLst>
   </p:cSld>
@@ -8789,13 +9029,13 @@
   <p:clrMapOvr>
     <a:masterClrMapping/>
   </p:clrMapOvr>
-  <mc:AlternateContent xmlns:mc="http://schemas.openxmlformats.org/markup-compatibility/2006">
-    <mc:Choice xmlns:p14="http://schemas.microsoft.com/office/powerpoint/2010/main" Requires="p14">
+  <mc:AlternateContent xmlns:mc="http://schemas.openxmlformats.org/markup-compatibility/2006" xmlns:p14="http://schemas.microsoft.com/office/powerpoint/2010/main">
+    <mc:Choice Requires="p14">
       <p:transition spd="med" p14:dur="700">
         <p:fade/>
       </p:transition>
     </mc:Choice>
-    <mc:Fallback>
+    <mc:Fallback xmlns="">
       <p:transition spd="med">
         <p:fade/>
       </p:transition>
@@ -8849,7 +9089,7 @@
           <a:p>
             <a:r>
               <a:rPr lang="en-US" dirty="0"/>
-              <a:t>Scriptable Object vs JSON</a:t>
+              <a:t>Pros</a:t>
             </a:r>
           </a:p>
         </p:txBody>
@@ -8873,7 +9113,7 @@
         <p:spPr>
           <a:xfrm>
             <a:off x="946602" y="1905000"/>
-            <a:ext cx="3700009" cy="4114801"/>
+            <a:ext cx="10177009" cy="4114801"/>
           </a:xfrm>
         </p:spPr>
         <p:txBody>
@@ -8886,8 +9126,8 @@
               <a:buNone/>
             </a:pPr>
             <a:r>
-              <a:rPr lang="en-US" dirty="0"/>
-              <a:t>Scriptable Object</a:t>
+              <a:rPr lang="en-US" altLang="ko-KR" dirty="0"/>
+              <a:t>Event Handling : Make it easy to work with events happening in some conditions. Easy to track changes.</a:t>
             </a:r>
           </a:p>
           <a:p>
@@ -8895,8 +9135,8 @@
               <a:buNone/>
             </a:pPr>
             <a:r>
-              <a:rPr lang="en-US" dirty="0"/>
-              <a:t>- Support all datatypes in C# and Unity</a:t>
+              <a:rPr lang="en-US" altLang="ko-KR" dirty="0"/>
+              <a:t>Memory Efficiency : Scriptable Object don’t need to be attached to Game Object. It reference the memory rather than copying which reduce overhead. </a:t>
             </a:r>
           </a:p>
           <a:p>
@@ -8904,295 +9144,22 @@
               <a:buNone/>
             </a:pPr>
             <a:r>
-              <a:rPr lang="en-US" dirty="0"/>
-              <a:t>- Flexible to use </a:t>
-            </a:r>
-          </a:p>
-        </p:txBody>
-      </p:sp>
-      <p:sp>
-        <p:nvSpPr>
-          <p:cNvPr id="4" name="Content Placeholder 2">
-            <a:extLst>
-              <a:ext uri="{FF2B5EF4-FFF2-40B4-BE49-F238E27FC236}">
-                <a16:creationId xmlns:a16="http://schemas.microsoft.com/office/drawing/2014/main" id="{C6BD65BD-48C6-5CFF-2A1F-304B3989A4EC}"/>
-              </a:ext>
-            </a:extLst>
-          </p:cNvPr>
-          <p:cNvSpPr txBox="1">
-            <a:spLocks/>
-          </p:cNvSpPr>
-          <p:nvPr/>
-        </p:nvSpPr>
-        <p:spPr>
-          <a:xfrm>
-            <a:off x="5513160" y="1905000"/>
-            <a:ext cx="3476852" cy="4114801"/>
-          </a:xfrm>
-          <a:prstGeom prst="rect">
-            <a:avLst/>
-          </a:prstGeom>
-        </p:spPr>
-        <p:txBody>
-          <a:bodyPr vert="horz" lIns="91440" tIns="45720" rIns="91440" bIns="45720" rtlCol="0">
-            <a:normAutofit/>
-          </a:bodyPr>
-          <a:lstStyle>
-            <a:lvl1pPr marL="223838" indent="-223838" algn="l" defTabSz="914400" rtl="0" eaLnBrk="1" latinLnBrk="0" hangingPunct="1">
-              <a:lnSpc>
-                <a:spcPct val="90000"/>
-              </a:lnSpc>
-              <a:spcBef>
-                <a:spcPts val="1800"/>
-              </a:spcBef>
-              <a:buClr>
-                <a:schemeClr val="accent1"/>
-              </a:buClr>
-              <a:buSzPct val="100000"/>
-              <a:buFont typeface="Arial" pitchFamily="34" charset="0"/>
-              <a:buChar char="•"/>
-              <a:defRPr sz="2400" kern="1200">
-                <a:solidFill>
-                  <a:schemeClr val="tx1"/>
-                </a:solidFill>
-                <a:latin typeface="+mn-lt"/>
-                <a:ea typeface="+mn-ea"/>
-                <a:cs typeface="+mn-cs"/>
-              </a:defRPr>
-            </a:lvl1pPr>
-            <a:lvl2pPr marL="463550" indent="-231775" algn="l" defTabSz="914400" rtl="0" eaLnBrk="1" latinLnBrk="0" hangingPunct="1">
-              <a:lnSpc>
-                <a:spcPct val="90000"/>
-              </a:lnSpc>
-              <a:spcBef>
-                <a:spcPts val="1200"/>
-              </a:spcBef>
-              <a:buClr>
-                <a:schemeClr val="accent1"/>
-              </a:buClr>
-              <a:buSzPct val="100000"/>
-              <a:buFont typeface="Arial" pitchFamily="34" charset="0"/>
-              <a:buChar char="•"/>
-              <a:defRPr sz="2000" kern="1200">
-                <a:solidFill>
-                  <a:schemeClr val="tx1"/>
-                </a:solidFill>
-                <a:latin typeface="+mn-lt"/>
-                <a:ea typeface="+mn-ea"/>
-                <a:cs typeface="+mn-cs"/>
-              </a:defRPr>
-            </a:lvl2pPr>
-            <a:lvl3pPr marL="682625" indent="-219075" algn="l" defTabSz="914400" rtl="0" eaLnBrk="1" latinLnBrk="0" hangingPunct="1">
-              <a:lnSpc>
-                <a:spcPct val="90000"/>
-              </a:lnSpc>
-              <a:spcBef>
-                <a:spcPts val="600"/>
-              </a:spcBef>
-              <a:buClr>
-                <a:schemeClr val="accent1"/>
-              </a:buClr>
-              <a:buSzPct val="100000"/>
-              <a:buFont typeface="Arial" pitchFamily="34" charset="0"/>
-              <a:buChar char="•"/>
-              <a:defRPr sz="1800" kern="1200">
-                <a:solidFill>
-                  <a:schemeClr val="tx1"/>
-                </a:solidFill>
-                <a:latin typeface="+mn-lt"/>
-                <a:ea typeface="+mn-ea"/>
-                <a:cs typeface="+mn-cs"/>
-              </a:defRPr>
-            </a:lvl3pPr>
-            <a:lvl4pPr marL="857250" indent="-174625" algn="l" defTabSz="914400" rtl="0" eaLnBrk="1" latinLnBrk="0" hangingPunct="1">
-              <a:lnSpc>
-                <a:spcPct val="90000"/>
-              </a:lnSpc>
-              <a:spcBef>
-                <a:spcPts val="600"/>
-              </a:spcBef>
-              <a:buClr>
-                <a:schemeClr val="accent1"/>
-              </a:buClr>
-              <a:buSzPct val="100000"/>
-              <a:buFont typeface="Arial" pitchFamily="34" charset="0"/>
-              <a:buChar char="•"/>
-              <a:defRPr sz="1600" kern="1200">
-                <a:solidFill>
-                  <a:schemeClr val="tx1"/>
-                </a:solidFill>
-                <a:latin typeface="+mn-lt"/>
-                <a:ea typeface="+mn-ea"/>
-                <a:cs typeface="+mn-cs"/>
-              </a:defRPr>
-            </a:lvl4pPr>
-            <a:lvl5pPr marL="1030288" indent="-173038" algn="l" defTabSz="914400" rtl="0" eaLnBrk="1" latinLnBrk="0" hangingPunct="1">
-              <a:lnSpc>
-                <a:spcPct val="90000"/>
-              </a:lnSpc>
-              <a:spcBef>
-                <a:spcPts val="600"/>
-              </a:spcBef>
-              <a:buClr>
-                <a:schemeClr val="accent1"/>
-              </a:buClr>
-              <a:buSzPct val="100000"/>
-              <a:buFont typeface="Arial" pitchFamily="34" charset="0"/>
-              <a:buChar char="•"/>
-              <a:defRPr sz="1600" kern="1200">
-                <a:solidFill>
-                  <a:schemeClr val="tx1"/>
-                </a:solidFill>
-                <a:latin typeface="+mn-lt"/>
-                <a:ea typeface="+mn-ea"/>
-                <a:cs typeface="+mn-cs"/>
-              </a:defRPr>
-            </a:lvl5pPr>
-            <a:lvl6pPr marL="1207008" indent="-173736" algn="l" defTabSz="914400" rtl="0" eaLnBrk="1" latinLnBrk="0" hangingPunct="1">
-              <a:spcBef>
-                <a:spcPts val="600"/>
-              </a:spcBef>
-              <a:buClr>
-                <a:schemeClr val="accent1"/>
-              </a:buClr>
-              <a:buFont typeface="Arial" pitchFamily="34" charset="0"/>
-              <a:buChar char="•"/>
-              <a:defRPr sz="1600" kern="1200">
-                <a:solidFill>
-                  <a:schemeClr val="tx1"/>
-                </a:solidFill>
-                <a:latin typeface="+mn-lt"/>
-                <a:ea typeface="+mn-ea"/>
-                <a:cs typeface="+mn-cs"/>
-              </a:defRPr>
-            </a:lvl6pPr>
-            <a:lvl7pPr marL="1380744" indent="-173736" algn="l" defTabSz="914400" rtl="0" eaLnBrk="1" latinLnBrk="0" hangingPunct="1">
-              <a:spcBef>
-                <a:spcPts val="600"/>
-              </a:spcBef>
-              <a:buClr>
-                <a:schemeClr val="accent1"/>
-              </a:buClr>
-              <a:buFont typeface="Arial" pitchFamily="34" charset="0"/>
-              <a:buChar char="•"/>
-              <a:defRPr sz="1600" kern="1200">
-                <a:solidFill>
-                  <a:schemeClr val="tx1"/>
-                </a:solidFill>
-                <a:latin typeface="+mn-lt"/>
-                <a:ea typeface="+mn-ea"/>
-                <a:cs typeface="+mn-cs"/>
-              </a:defRPr>
-            </a:lvl7pPr>
-            <a:lvl8pPr marL="1554480" indent="-173736" algn="l" defTabSz="914400" rtl="0" eaLnBrk="1" latinLnBrk="0" hangingPunct="1">
-              <a:spcBef>
-                <a:spcPts val="600"/>
-              </a:spcBef>
-              <a:buClr>
-                <a:schemeClr val="accent1"/>
-              </a:buClr>
-              <a:buFont typeface="Arial" pitchFamily="34" charset="0"/>
-              <a:buChar char="•"/>
-              <a:defRPr sz="1600" kern="1200">
-                <a:solidFill>
-                  <a:schemeClr val="tx1"/>
-                </a:solidFill>
-                <a:latin typeface="+mn-lt"/>
-                <a:ea typeface="+mn-ea"/>
-                <a:cs typeface="+mn-cs"/>
-              </a:defRPr>
-            </a:lvl8pPr>
-            <a:lvl9pPr marL="1728216" indent="-173736" algn="l" defTabSz="914400" rtl="0" eaLnBrk="1" latinLnBrk="0" hangingPunct="1">
-              <a:spcBef>
-                <a:spcPts val="600"/>
-              </a:spcBef>
-              <a:buClr>
-                <a:schemeClr val="accent1"/>
-              </a:buClr>
-              <a:buFont typeface="Arial" pitchFamily="34" charset="0"/>
-              <a:buChar char="•"/>
-              <a:defRPr sz="1600" kern="1200">
-                <a:solidFill>
-                  <a:schemeClr val="tx1"/>
-                </a:solidFill>
-                <a:latin typeface="+mn-lt"/>
-                <a:ea typeface="+mn-ea"/>
-                <a:cs typeface="+mn-cs"/>
-              </a:defRPr>
-            </a:lvl9pPr>
-          </a:lstStyle>
+              <a:rPr lang="en-US" altLang="ko-KR" dirty="0"/>
+              <a:t>Immutability : The data doesn’t change nor reset the value.</a:t>
+            </a:r>
+          </a:p>
           <a:p>
             <a:pPr marL="0" indent="0">
-              <a:buFont typeface="Arial" pitchFamily="34" charset="0"/>
               <a:buNone/>
             </a:pPr>
-            <a:r>
-              <a:rPr lang="en-US" altLang="ko-KR" dirty="0"/>
-              <a:t>JSON</a:t>
-            </a:r>
-          </a:p>
-          <a:p>
-            <a:pPr marL="0" indent="0">
-              <a:buFont typeface="Arial" pitchFamily="34" charset="0"/>
-              <a:buNone/>
-            </a:pPr>
-            <a:r>
-              <a:rPr lang="en-US" altLang="ko-KR" dirty="0"/>
-              <a:t>- Support basic datatypes</a:t>
-            </a:r>
-          </a:p>
-          <a:p>
-            <a:pPr marL="0" indent="0">
-              <a:buFont typeface="Arial" pitchFamily="34" charset="0"/>
-              <a:buNone/>
-            </a:pPr>
-            <a:r>
-              <a:rPr lang="en-US" altLang="ko-KR" dirty="0"/>
-              <a:t>- Text Based</a:t>
-            </a:r>
-          </a:p>
-          <a:p>
-            <a:pPr marL="0" indent="0">
-              <a:buFont typeface="Arial" pitchFamily="34" charset="0"/>
-              <a:buNone/>
-            </a:pPr>
-            <a:r>
-              <a:rPr lang="en-US" dirty="0"/>
-              <a:t>- Useful for Save &amp; Load</a:t>
-            </a:r>
             <a:endParaRPr lang="en-US" altLang="ko-KR" dirty="0"/>
-          </a:p>
-          <a:p>
-            <a:pPr marL="0" indent="0">
-              <a:buFont typeface="Arial" pitchFamily="34" charset="0"/>
-              <a:buNone/>
-            </a:pPr>
-            <a:r>
-              <a:rPr lang="en-US" altLang="ko-KR" dirty="0"/>
-              <a:t>- Useful for large projects</a:t>
-            </a:r>
-            <a:r>
-              <a:rPr lang="ko-KR" altLang="en-US" dirty="0"/>
-              <a:t> </a:t>
-            </a:r>
-            <a:endParaRPr lang="en-US" altLang="ko-KR" dirty="0"/>
-          </a:p>
-          <a:p>
-            <a:pPr marL="0" indent="0">
-              <a:buFont typeface="Arial" pitchFamily="34" charset="0"/>
-              <a:buNone/>
-            </a:pPr>
-            <a:r>
-              <a:rPr lang="en-US" dirty="0"/>
-              <a:t>- Manage data in excel </a:t>
-            </a:r>
           </a:p>
         </p:txBody>
       </p:sp>
     </p:spTree>
     <p:extLst>
       <p:ext uri="{BB962C8B-B14F-4D97-AF65-F5344CB8AC3E}">
-        <p14:creationId xmlns:p14="http://schemas.microsoft.com/office/powerpoint/2010/main" val="2193125552"/>
+        <p14:creationId xmlns:p14="http://schemas.microsoft.com/office/powerpoint/2010/main" val="4104786626"/>
       </p:ext>
     </p:extLst>
   </p:cSld>
@@ -9259,7 +9226,7 @@
           <a:p>
             <a:r>
               <a:rPr lang="en-US" dirty="0"/>
-              <a:t>Pros</a:t>
+              <a:t>Be cautious</a:t>
             </a:r>
           </a:p>
         </p:txBody>
@@ -9297,25 +9264,7 @@
             </a:pPr>
             <a:r>
               <a:rPr lang="en-US" altLang="ko-KR" dirty="0"/>
-              <a:t>Event Handling : Make it easy to work with events happening in some conditions. Easy to track changes.</a:t>
-            </a:r>
-          </a:p>
-          <a:p>
-            <a:pPr marL="0" indent="0">
-              <a:buNone/>
-            </a:pPr>
-            <a:r>
-              <a:rPr lang="en-US" altLang="ko-KR" dirty="0"/>
-              <a:t>Memory Efficiency : Scriptable Object don’t need to be attached to Game Object. It reference the memory rather than copying which reduce overhead. </a:t>
-            </a:r>
-          </a:p>
-          <a:p>
-            <a:pPr marL="0" indent="0">
-              <a:buNone/>
-            </a:pPr>
-            <a:r>
-              <a:rPr lang="en-US" altLang="ko-KR" dirty="0"/>
-              <a:t>Immutability : The data doesn’t change nor reset the value.</a:t>
+              <a:t>Immutability : The data doesn’t change nor reset the value. So use the data that the value doesn’t change throughout the game. (It’s not used for player character! )</a:t>
             </a:r>
           </a:p>
           <a:p>
@@ -9329,7 +9278,7 @@
     </p:spTree>
     <p:extLst>
       <p:ext uri="{BB962C8B-B14F-4D97-AF65-F5344CB8AC3E}">
-        <p14:creationId xmlns:p14="http://schemas.microsoft.com/office/powerpoint/2010/main" val="4104786626"/>
+        <p14:creationId xmlns:p14="http://schemas.microsoft.com/office/powerpoint/2010/main" val="3516388140"/>
       </p:ext>
     </p:extLst>
   </p:cSld>
@@ -10131,6 +10080,15 @@
 </file>
 
 <file path=customXml/item1.xml><?xml version="1.0" encoding="utf-8"?>
+<?mso-contentType ?>
+<FormTemplates xmlns="http://schemas.microsoft.com/sharepoint/v3/contenttype/forms">
+  <Display>DocumentLibraryForm</Display>
+  <Edit>AssetEditForm</Edit>
+  <New>DocumentLibraryForm</New>
+</FormTemplates>
+</file>
+
+<file path=customXml/item2.xml><?xml version="1.0" encoding="utf-8"?>
 <p:properties xmlns:p="http://schemas.microsoft.com/office/2006/metadata/properties" xmlns:xsi="http://www.w3.org/2001/XMLSchema-instance" xmlns:pc="http://schemas.microsoft.com/office/infopath/2007/PartnerControls">
   <documentManagement>
     <DirectSourceMarket xmlns="4873beb7-5857-4685-be1f-d57550cc96cc" xsi:nil="true"/>
@@ -10255,15 +10213,6 @@
     <LocMarketGroupTiers2 xmlns="4873beb7-5857-4685-be1f-d57550cc96cc" xsi:nil="true"/>
   </documentManagement>
 </p:properties>
-</file>
-
-<file path=customXml/item2.xml><?xml version="1.0" encoding="utf-8"?>
-<?mso-contentType ?>
-<FormTemplates xmlns="http://schemas.microsoft.com/sharepoint/v3/contenttype/forms">
-  <Display>DocumentLibraryForm</Display>
-  <Edit>AssetEditForm</Edit>
-  <New>DocumentLibraryForm</New>
-</FormTemplates>
 </file>
 
 <file path=customXml/item3.xml><?xml version="1.0" encoding="utf-8"?>
@@ -11307,6 +11256,14 @@
 </file>
 
 <file path=customXml/itemProps1.xml><?xml version="1.0" encoding="utf-8"?>
+<ds:datastoreItem xmlns:ds="http://schemas.openxmlformats.org/officeDocument/2006/customXml" ds:itemID="{74228E6B-D70C-44BB-A81F-A245495F612B}">
+  <ds:schemaRefs>
+    <ds:schemaRef ds:uri="http://schemas.microsoft.com/sharepoint/v3/contenttype/forms"/>
+  </ds:schemaRefs>
+</ds:datastoreItem>
+</file>
+
+<file path=customXml/itemProps2.xml><?xml version="1.0" encoding="utf-8"?>
 <ds:datastoreItem xmlns:ds="http://schemas.openxmlformats.org/officeDocument/2006/customXml" ds:itemID="{00E41224-0370-4595-877C-23316CD80004}">
   <ds:schemaRefs>
     <ds:schemaRef ds:uri="http://purl.org/dc/terms/"/>
@@ -11318,14 +11275,6 @@
     <ds:schemaRef ds:uri="http://schemas.microsoft.com/office/infopath/2007/PartnerControls"/>
     <ds:schemaRef ds:uri="http://www.w3.org/XML/1998/namespace"/>
     <ds:schemaRef ds:uri="http://purl.org/dc/dcmitype/"/>
-  </ds:schemaRefs>
-</ds:datastoreItem>
-</file>
-
-<file path=customXml/itemProps2.xml><?xml version="1.0" encoding="utf-8"?>
-<ds:datastoreItem xmlns:ds="http://schemas.openxmlformats.org/officeDocument/2006/customXml" ds:itemID="{74228E6B-D70C-44BB-A81F-A245495F612B}">
-  <ds:schemaRefs>
-    <ds:schemaRef ds:uri="http://schemas.microsoft.com/sharepoint/v3/contenttype/forms"/>
   </ds:schemaRefs>
 </ds:datastoreItem>
 </file>

</xml_diff>